<commit_message>
Fixed input warning sign
</commit_message>
<xml_diff>
--- a/Presentatie/2015 06 04 Presentatie II.pptx
+++ b/Presentatie/2015 06 04 Presentatie II.pptx
@@ -119,6 +119,22 @@
       </a:defRPr>
     </a:lvl9pPr>
   </p:defaultTextStyle>
+  <p:extLst>
+    <p:ext uri="{EFAFB233-063F-42B5-8137-9DF3F51BA10A}">
+      <p15:sldGuideLst xmlns:p15="http://schemas.microsoft.com/office/powerpoint/2012/main">
+        <p15:guide id="1" orient="horz" pos="2160">
+          <p15:clr>
+            <a:srgbClr val="A4A3A4"/>
+          </p15:clr>
+        </p15:guide>
+        <p15:guide id="2" pos="2880">
+          <p15:clr>
+            <a:srgbClr val="A4A3A4"/>
+          </p15:clr>
+        </p15:guide>
+      </p15:sldGuideLst>
+    </p:ext>
+  </p:extLst>
 </p:presentation>
 </file>
 
@@ -204,7 +220,7 @@
           <a:p>
             <a:fld id="{76CB4545-7074-4987-9311-BC63D77EFF55}" type="datetimeFigureOut">
               <a:rPr lang="nl-BE" smtClean="0"/>
-              <a:t>4/06/2015</a:t>
+              <a:t>9/06/2015</a:t>
             </a:fld>
             <a:endParaRPr lang="nl-BE"/>
           </a:p>
@@ -1528,7 +1544,7 @@
                 </a:solidFill>
               </a:rPr>
               <a:pPr/>
-              <a:t>6/4/2015</a:t>
+              <a:t>6/9/2015</a:t>
             </a:fld>
             <a:endParaRPr lang="en-US" dirty="0">
               <a:solidFill>
@@ -1720,7 +1736,7 @@
                 </a:solidFill>
               </a:rPr>
               <a:pPr/>
-              <a:t>6/4/2015</a:t>
+              <a:t>6/9/2015</a:t>
             </a:fld>
             <a:endParaRPr lang="en-US" dirty="0">
               <a:solidFill>
@@ -1965,7 +1981,7 @@
                 </a:solidFill>
               </a:rPr>
               <a:pPr/>
-              <a:t>6/4/2015</a:t>
+              <a:t>6/9/2015</a:t>
             </a:fld>
             <a:endParaRPr lang="en-US" dirty="0">
               <a:solidFill>
@@ -2167,7 +2183,7 @@
                 </a:solidFill>
               </a:rPr>
               <a:pPr/>
-              <a:t>6/4/2015</a:t>
+              <a:t>6/9/2015</a:t>
             </a:fld>
             <a:endParaRPr lang="en-US" dirty="0">
               <a:solidFill>
@@ -2495,7 +2511,7 @@
                 </a:solidFill>
               </a:rPr>
               <a:pPr/>
-              <a:t>6/4/2015</a:t>
+              <a:t>6/9/2015</a:t>
             </a:fld>
             <a:endParaRPr lang="en-US" dirty="0">
               <a:solidFill>
@@ -2821,7 +2837,7 @@
                 </a:solidFill>
               </a:rPr>
               <a:pPr/>
-              <a:t>6/4/2015</a:t>
+              <a:t>6/9/2015</a:t>
             </a:fld>
             <a:endParaRPr lang="en-US" dirty="0">
               <a:solidFill>
@@ -3265,7 +3281,7 @@
                 </a:solidFill>
               </a:rPr>
               <a:pPr/>
-              <a:t>6/4/2015</a:t>
+              <a:t>6/9/2015</a:t>
             </a:fld>
             <a:endParaRPr lang="en-US" dirty="0">
               <a:solidFill>
@@ -3405,7 +3421,7 @@
                 </a:solidFill>
               </a:rPr>
               <a:pPr/>
-              <a:t>6/4/2015</a:t>
+              <a:t>6/9/2015</a:t>
             </a:fld>
             <a:endParaRPr lang="en-US" dirty="0">
               <a:solidFill>
@@ -3522,7 +3538,7 @@
                 </a:solidFill>
               </a:rPr>
               <a:pPr/>
-              <a:t>6/4/2015</a:t>
+              <a:t>6/9/2015</a:t>
             </a:fld>
             <a:endParaRPr lang="en-US" dirty="0">
               <a:solidFill>
@@ -3817,7 +3833,7 @@
                 </a:solidFill>
               </a:rPr>
               <a:pPr/>
-              <a:t>6/4/2015</a:t>
+              <a:t>6/9/2015</a:t>
             </a:fld>
             <a:endParaRPr lang="en-US" dirty="0">
               <a:solidFill>
@@ -4104,7 +4120,7 @@
                 </a:solidFill>
               </a:rPr>
               <a:pPr/>
-              <a:t>6/4/2015</a:t>
+              <a:t>6/9/2015</a:t>
             </a:fld>
             <a:endParaRPr lang="en-US" dirty="0">
               <a:solidFill>
@@ -4376,7 +4392,7 @@
                 </a:solidFill>
               </a:rPr>
               <a:pPr defTabSz="457200"/>
-              <a:t>6/4/2015</a:t>
+              <a:t>6/9/2015</a:t>
             </a:fld>
             <a:endParaRPr lang="en-US" dirty="0">
               <a:solidFill>
@@ -4979,7 +4995,7 @@
       </p:sp>
       <p:sp>
         <p:nvSpPr>
-          <p:cNvPr id="5" name="Tijdelijke aanduiding voor inhoud 4"/>
+          <p:cNvPr id="3" name="Tijdelijke aanduiding voor inhoud 2"/>
           <p:cNvSpPr>
             <a:spLocks noGrp="1"/>
           </p:cNvSpPr>
@@ -4989,15 +5005,10 @@
         </p:nvSpPr>
         <p:spPr/>
         <p:txBody>
-          <a:bodyPr>
-            <a:normAutofit/>
-          </a:bodyPr>
-          <a:lstStyle/>
-          <a:p>
-            <a:pPr marL="228600" lvl="1" indent="0">
-              <a:buNone/>
-            </a:pPr>
-            <a:endParaRPr lang="en-US" altLang="nl-BE" sz="2400" dirty="0"/>
+          <a:bodyPr/>
+          <a:lstStyle/>
+          <a:p>
+            <a:endParaRPr lang="nl-BE" dirty="0"/>
           </a:p>
         </p:txBody>
       </p:sp>
@@ -5081,7 +5092,7 @@
             <a:pPr marL="228600" lvl="1" indent="0">
               <a:buNone/>
             </a:pPr>
-            <a:endParaRPr lang="en-US" altLang="nl-BE" sz="2400" dirty="0"/>
+            <a:endParaRPr lang="en-US" altLang="nl-BE" sz="2400" dirty="0" smtClean="0"/>
           </a:p>
         </p:txBody>
       </p:sp>
@@ -6405,7 +6416,7 @@
   <a:extraClrSchemeLst/>
   <a:extLst>
     <a:ext uri="{05A4C25C-085E-4340-85A3-A5531E510DB2}">
-      <thm15:themeFamily xmlns="" xmlns:thm15="http://schemas.microsoft.com/office/thememl/2012/main" name="Banded" id="{98DFF888-2449-4D28-977C-6306C017633E}" vid="{9792607F-9579-4224-82FF-9C88C3E1E53D}"/>
+      <thm15:themeFamily xmlns:thm15="http://schemas.microsoft.com/office/thememl/2012/main" name="Banded" id="{98DFF888-2449-4D28-977C-6306C017633E}" vid="{9792607F-9579-4224-82FF-9C88C3E1E53D}"/>
     </a:ext>
   </a:extLst>
 </a:theme>

</xml_diff>